<commit_message>
Updated power point deck
</commit_message>
<xml_diff>
--- a/AngularCLI demo.pptx
+++ b/AngularCLI demo.pptx
@@ -258,7 +258,7 @@
           </a:lstStyle>
           <a:p>
             <a:r>
-              <a:rPr lang="en-US" smtClean="0"/>
+              <a:rPr lang="en-US"/>
               <a:t>Click to edit Master title style</a:t>
             </a:r>
             <a:endParaRPr lang="en-US" dirty="0"/>
@@ -330,7 +330,7 @@
           </a:lstStyle>
           <a:p>
             <a:r>
-              <a:rPr lang="en-US" smtClean="0"/>
+              <a:rPr lang="en-US"/>
               <a:t>Click to edit Master subtitle style</a:t>
             </a:r>
             <a:endParaRPr lang="en-US" dirty="0"/>
@@ -354,7 +354,7 @@
           <a:p>
             <a:fld id="{3A9514F2-6314-4A32-A45D-D19894738DE7}" type="datetimeFigureOut">
               <a:rPr lang="en-US" smtClean="0"/>
-              <a:t>3/7/2017</a:t>
+              <a:t>3/9/2017</a:t>
             </a:fld>
             <a:endParaRPr lang="en-US"/>
           </a:p>
@@ -486,7 +486,7 @@
           <a:lstStyle/>
           <a:p>
             <a:r>
-              <a:rPr lang="en-US" smtClean="0"/>
+              <a:rPr lang="en-US"/>
               <a:t>Click to edit Master title style</a:t>
             </a:r>
             <a:endParaRPr lang="en-US" dirty="0"/>
@@ -510,35 +510,35 @@
           <a:p>
             <a:pPr lvl="0"/>
             <a:r>
-              <a:rPr lang="en-US" smtClean="0"/>
+              <a:rPr lang="en-US"/>
               <a:t>Click to edit Master text styles</a:t>
             </a:r>
           </a:p>
           <a:p>
             <a:pPr lvl="1"/>
             <a:r>
-              <a:rPr lang="en-US" smtClean="0"/>
+              <a:rPr lang="en-US"/>
               <a:t>Second level</a:t>
             </a:r>
           </a:p>
           <a:p>
             <a:pPr lvl="2"/>
             <a:r>
-              <a:rPr lang="en-US" smtClean="0"/>
+              <a:rPr lang="en-US"/>
               <a:t>Third level</a:t>
             </a:r>
           </a:p>
           <a:p>
             <a:pPr lvl="3"/>
             <a:r>
-              <a:rPr lang="en-US" smtClean="0"/>
+              <a:rPr lang="en-US"/>
               <a:t>Fourth level</a:t>
             </a:r>
           </a:p>
           <a:p>
             <a:pPr lvl="4"/>
             <a:r>
-              <a:rPr lang="en-US" smtClean="0"/>
+              <a:rPr lang="en-US"/>
               <a:t>Fifth level</a:t>
             </a:r>
             <a:endParaRPr lang="en-US" dirty="0"/>
@@ -562,7 +562,7 @@
           <a:p>
             <a:fld id="{3A9514F2-6314-4A32-A45D-D19894738DE7}" type="datetimeFigureOut">
               <a:rPr lang="en-US" smtClean="0"/>
-              <a:t>3/7/2017</a:t>
+              <a:t>3/9/2017</a:t>
             </a:fld>
             <a:endParaRPr lang="en-US"/>
           </a:p>
@@ -739,7 +739,7 @@
           <a:lstStyle/>
           <a:p>
             <a:r>
-              <a:rPr lang="en-US" smtClean="0"/>
+              <a:rPr lang="en-US"/>
               <a:t>Click to edit Master title style</a:t>
             </a:r>
             <a:endParaRPr lang="en-US" dirty="0"/>
@@ -768,35 +768,35 @@
           <a:p>
             <a:pPr lvl="0"/>
             <a:r>
-              <a:rPr lang="en-US" smtClean="0"/>
+              <a:rPr lang="en-US"/>
               <a:t>Click to edit Master text styles</a:t>
             </a:r>
           </a:p>
           <a:p>
             <a:pPr lvl="1"/>
             <a:r>
-              <a:rPr lang="en-US" smtClean="0"/>
+              <a:rPr lang="en-US"/>
               <a:t>Second level</a:t>
             </a:r>
           </a:p>
           <a:p>
             <a:pPr lvl="2"/>
             <a:r>
-              <a:rPr lang="en-US" smtClean="0"/>
+              <a:rPr lang="en-US"/>
               <a:t>Third level</a:t>
             </a:r>
           </a:p>
           <a:p>
             <a:pPr lvl="3"/>
             <a:r>
-              <a:rPr lang="en-US" smtClean="0"/>
+              <a:rPr lang="en-US"/>
               <a:t>Fourth level</a:t>
             </a:r>
           </a:p>
           <a:p>
             <a:pPr lvl="4"/>
             <a:r>
-              <a:rPr lang="en-US" smtClean="0"/>
+              <a:rPr lang="en-US"/>
               <a:t>Fifth level</a:t>
             </a:r>
             <a:endParaRPr lang="en-US" dirty="0"/>
@@ -820,7 +820,7 @@
           <a:p>
             <a:fld id="{3A9514F2-6314-4A32-A45D-D19894738DE7}" type="datetimeFigureOut">
               <a:rPr lang="en-US" smtClean="0"/>
-              <a:t>3/7/2017</a:t>
+              <a:t>3/9/2017</a:t>
             </a:fld>
             <a:endParaRPr lang="en-US"/>
           </a:p>
@@ -914,7 +914,7 @@
           <a:lstStyle/>
           <a:p>
             <a:r>
-              <a:rPr lang="en-US" smtClean="0"/>
+              <a:rPr lang="en-US"/>
               <a:t>Click to edit Master title style</a:t>
             </a:r>
             <a:endParaRPr lang="en-US" dirty="0"/>
@@ -938,35 +938,35 @@
           <a:p>
             <a:pPr lvl="0"/>
             <a:r>
-              <a:rPr lang="en-US" smtClean="0"/>
+              <a:rPr lang="en-US"/>
               <a:t>Click to edit Master text styles</a:t>
             </a:r>
           </a:p>
           <a:p>
             <a:pPr lvl="1"/>
             <a:r>
-              <a:rPr lang="en-US" smtClean="0"/>
+              <a:rPr lang="en-US"/>
               <a:t>Second level</a:t>
             </a:r>
           </a:p>
           <a:p>
             <a:pPr lvl="2"/>
             <a:r>
-              <a:rPr lang="en-US" smtClean="0"/>
+              <a:rPr lang="en-US"/>
               <a:t>Third level</a:t>
             </a:r>
           </a:p>
           <a:p>
             <a:pPr lvl="3"/>
             <a:r>
-              <a:rPr lang="en-US" smtClean="0"/>
+              <a:rPr lang="en-US"/>
               <a:t>Fourth level</a:t>
             </a:r>
           </a:p>
           <a:p>
             <a:pPr lvl="4"/>
             <a:r>
-              <a:rPr lang="en-US" smtClean="0"/>
+              <a:rPr lang="en-US"/>
               <a:t>Fifth level</a:t>
             </a:r>
             <a:endParaRPr lang="en-US" dirty="0"/>
@@ -990,7 +990,7 @@
           <a:p>
             <a:fld id="{3A9514F2-6314-4A32-A45D-D19894738DE7}" type="datetimeFigureOut">
               <a:rPr lang="en-US" smtClean="0"/>
-              <a:t>3/7/2017</a:t>
+              <a:t>3/9/2017</a:t>
             </a:fld>
             <a:endParaRPr lang="en-US"/>
           </a:p>
@@ -1183,7 +1183,7 @@
           </a:lstStyle>
           <a:p>
             <a:r>
-              <a:rPr lang="en-US" smtClean="0"/>
+              <a:rPr lang="en-US"/>
               <a:t>Click to edit Master title style</a:t>
             </a:r>
             <a:endParaRPr lang="en-US" dirty="0"/>
@@ -1304,7 +1304,7 @@
           <a:p>
             <a:pPr lvl="0"/>
             <a:r>
-              <a:rPr lang="en-US" smtClean="0"/>
+              <a:rPr lang="en-US"/>
               <a:t>Click to edit Master text styles</a:t>
             </a:r>
           </a:p>
@@ -1327,7 +1327,7 @@
           <a:p>
             <a:fld id="{3A9514F2-6314-4A32-A45D-D19894738DE7}" type="datetimeFigureOut">
               <a:rPr lang="en-US" smtClean="0"/>
-              <a:t>3/7/2017</a:t>
+              <a:t>3/9/2017</a:t>
             </a:fld>
             <a:endParaRPr lang="en-US"/>
           </a:p>
@@ -1464,7 +1464,7 @@
           <a:lstStyle/>
           <a:p>
             <a:r>
-              <a:rPr lang="en-US" smtClean="0"/>
+              <a:rPr lang="en-US"/>
               <a:t>Click to edit Master title style</a:t>
             </a:r>
             <a:endParaRPr lang="en-US" dirty="0"/>
@@ -1493,35 +1493,35 @@
           <a:p>
             <a:pPr lvl="0"/>
             <a:r>
-              <a:rPr lang="en-US" smtClean="0"/>
+              <a:rPr lang="en-US"/>
               <a:t>Click to edit Master text styles</a:t>
             </a:r>
           </a:p>
           <a:p>
             <a:pPr lvl="1"/>
             <a:r>
-              <a:rPr lang="en-US" smtClean="0"/>
+              <a:rPr lang="en-US"/>
               <a:t>Second level</a:t>
             </a:r>
           </a:p>
           <a:p>
             <a:pPr lvl="2"/>
             <a:r>
-              <a:rPr lang="en-US" smtClean="0"/>
+              <a:rPr lang="en-US"/>
               <a:t>Third level</a:t>
             </a:r>
           </a:p>
           <a:p>
             <a:pPr lvl="3"/>
             <a:r>
-              <a:rPr lang="en-US" smtClean="0"/>
+              <a:rPr lang="en-US"/>
               <a:t>Fourth level</a:t>
             </a:r>
           </a:p>
           <a:p>
             <a:pPr lvl="4"/>
             <a:r>
-              <a:rPr lang="en-US" smtClean="0"/>
+              <a:rPr lang="en-US"/>
               <a:t>Fifth level</a:t>
             </a:r>
             <a:endParaRPr lang="en-US" dirty="0"/>
@@ -1550,35 +1550,35 @@
           <a:p>
             <a:pPr lvl="0"/>
             <a:r>
-              <a:rPr lang="en-US" smtClean="0"/>
+              <a:rPr lang="en-US"/>
               <a:t>Click to edit Master text styles</a:t>
             </a:r>
           </a:p>
           <a:p>
             <a:pPr lvl="1"/>
             <a:r>
-              <a:rPr lang="en-US" smtClean="0"/>
+              <a:rPr lang="en-US"/>
               <a:t>Second level</a:t>
             </a:r>
           </a:p>
           <a:p>
             <a:pPr lvl="2"/>
             <a:r>
-              <a:rPr lang="en-US" smtClean="0"/>
+              <a:rPr lang="en-US"/>
               <a:t>Third level</a:t>
             </a:r>
           </a:p>
           <a:p>
             <a:pPr lvl="3"/>
             <a:r>
-              <a:rPr lang="en-US" smtClean="0"/>
+              <a:rPr lang="en-US"/>
               <a:t>Fourth level</a:t>
             </a:r>
           </a:p>
           <a:p>
             <a:pPr lvl="4"/>
             <a:r>
-              <a:rPr lang="en-US" smtClean="0"/>
+              <a:rPr lang="en-US"/>
               <a:t>Fifth level</a:t>
             </a:r>
             <a:endParaRPr lang="en-US" dirty="0"/>
@@ -1602,7 +1602,7 @@
           <a:p>
             <a:fld id="{3A9514F2-6314-4A32-A45D-D19894738DE7}" type="datetimeFigureOut">
               <a:rPr lang="en-US" smtClean="0"/>
-              <a:t>3/7/2017</a:t>
+              <a:t>3/9/2017</a:t>
             </a:fld>
             <a:endParaRPr lang="en-US"/>
           </a:p>
@@ -1701,7 +1701,7 @@
           <a:lstStyle/>
           <a:p>
             <a:r>
-              <a:rPr lang="en-US" smtClean="0"/>
+              <a:rPr lang="en-US"/>
               <a:t>Click to edit Master title style</a:t>
             </a:r>
             <a:endParaRPr lang="en-US" dirty="0"/>
@@ -1775,7 +1775,7 @@
           <a:p>
             <a:pPr lvl="0"/>
             <a:r>
-              <a:rPr lang="en-US" smtClean="0"/>
+              <a:rPr lang="en-US"/>
               <a:t>Click to edit Master text styles</a:t>
             </a:r>
           </a:p>
@@ -1803,35 +1803,35 @@
           <a:p>
             <a:pPr lvl="0"/>
             <a:r>
-              <a:rPr lang="en-US" smtClean="0"/>
+              <a:rPr lang="en-US"/>
               <a:t>Click to edit Master text styles</a:t>
             </a:r>
           </a:p>
           <a:p>
             <a:pPr lvl="1"/>
             <a:r>
-              <a:rPr lang="en-US" smtClean="0"/>
+              <a:rPr lang="en-US"/>
               <a:t>Second level</a:t>
             </a:r>
           </a:p>
           <a:p>
             <a:pPr lvl="2"/>
             <a:r>
-              <a:rPr lang="en-US" smtClean="0"/>
+              <a:rPr lang="en-US"/>
               <a:t>Third level</a:t>
             </a:r>
           </a:p>
           <a:p>
             <a:pPr lvl="3"/>
             <a:r>
-              <a:rPr lang="en-US" smtClean="0"/>
+              <a:rPr lang="en-US"/>
               <a:t>Fourth level</a:t>
             </a:r>
           </a:p>
           <a:p>
             <a:pPr lvl="4"/>
             <a:r>
-              <a:rPr lang="en-US" smtClean="0"/>
+              <a:rPr lang="en-US"/>
               <a:t>Fifth level</a:t>
             </a:r>
             <a:endParaRPr lang="en-US" dirty="0"/>
@@ -1905,7 +1905,7 @@
           <a:p>
             <a:pPr lvl="0"/>
             <a:r>
-              <a:rPr lang="en-US" smtClean="0"/>
+              <a:rPr lang="en-US"/>
               <a:t>Click to edit Master text styles</a:t>
             </a:r>
           </a:p>
@@ -1933,35 +1933,35 @@
           <a:p>
             <a:pPr lvl="0"/>
             <a:r>
-              <a:rPr lang="en-US" smtClean="0"/>
+              <a:rPr lang="en-US"/>
               <a:t>Click to edit Master text styles</a:t>
             </a:r>
           </a:p>
           <a:p>
             <a:pPr lvl="1"/>
             <a:r>
-              <a:rPr lang="en-US" smtClean="0"/>
+              <a:rPr lang="en-US"/>
               <a:t>Second level</a:t>
             </a:r>
           </a:p>
           <a:p>
             <a:pPr lvl="2"/>
             <a:r>
-              <a:rPr lang="en-US" smtClean="0"/>
+              <a:rPr lang="en-US"/>
               <a:t>Third level</a:t>
             </a:r>
           </a:p>
           <a:p>
             <a:pPr lvl="3"/>
             <a:r>
-              <a:rPr lang="en-US" smtClean="0"/>
+              <a:rPr lang="en-US"/>
               <a:t>Fourth level</a:t>
             </a:r>
           </a:p>
           <a:p>
             <a:pPr lvl="4"/>
             <a:r>
-              <a:rPr lang="en-US" smtClean="0"/>
+              <a:rPr lang="en-US"/>
               <a:t>Fifth level</a:t>
             </a:r>
             <a:endParaRPr lang="en-US" dirty="0"/>
@@ -1985,7 +1985,7 @@
           <a:p>
             <a:fld id="{3A9514F2-6314-4A32-A45D-D19894738DE7}" type="datetimeFigureOut">
               <a:rPr lang="en-US" smtClean="0"/>
-              <a:t>3/7/2017</a:t>
+              <a:t>3/9/2017</a:t>
             </a:fld>
             <a:endParaRPr lang="en-US"/>
           </a:p>
@@ -2079,7 +2079,7 @@
           <a:lstStyle/>
           <a:p>
             <a:r>
-              <a:rPr lang="en-US" smtClean="0"/>
+              <a:rPr lang="en-US"/>
               <a:t>Click to edit Master title style</a:t>
             </a:r>
             <a:endParaRPr lang="en-US" dirty="0"/>
@@ -2103,7 +2103,7 @@
           <a:p>
             <a:fld id="{3A9514F2-6314-4A32-A45D-D19894738DE7}" type="datetimeFigureOut">
               <a:rPr lang="en-US" smtClean="0"/>
-              <a:t>3/7/2017</a:t>
+              <a:t>3/9/2017</a:t>
             </a:fld>
             <a:endParaRPr lang="en-US"/>
           </a:p>
@@ -2276,7 +2276,7 @@
           <a:p>
             <a:fld id="{3A9514F2-6314-4A32-A45D-D19894738DE7}" type="datetimeFigureOut">
               <a:rPr lang="en-US" smtClean="0"/>
-              <a:t>3/7/2017</a:t>
+              <a:t>3/9/2017</a:t>
             </a:fld>
             <a:endParaRPr lang="en-US"/>
           </a:p>
@@ -2471,7 +2471,7 @@
           </a:lstStyle>
           <a:p>
             <a:r>
-              <a:rPr lang="en-US" smtClean="0"/>
+              <a:rPr lang="en-US"/>
               <a:t>Click to edit Master title style</a:t>
             </a:r>
             <a:endParaRPr lang="en-US" dirty="0"/>
@@ -2500,35 +2500,35 @@
           <a:p>
             <a:pPr lvl="0"/>
             <a:r>
-              <a:rPr lang="en-US" smtClean="0"/>
+              <a:rPr lang="en-US"/>
               <a:t>Click to edit Master text styles</a:t>
             </a:r>
           </a:p>
           <a:p>
             <a:pPr lvl="1"/>
             <a:r>
-              <a:rPr lang="en-US" smtClean="0"/>
+              <a:rPr lang="en-US"/>
               <a:t>Second level</a:t>
             </a:r>
           </a:p>
           <a:p>
             <a:pPr lvl="2"/>
             <a:r>
-              <a:rPr lang="en-US" smtClean="0"/>
+              <a:rPr lang="en-US"/>
               <a:t>Third level</a:t>
             </a:r>
           </a:p>
           <a:p>
             <a:pPr lvl="3"/>
             <a:r>
-              <a:rPr lang="en-US" smtClean="0"/>
+              <a:rPr lang="en-US"/>
               <a:t>Fourth level</a:t>
             </a:r>
           </a:p>
           <a:p>
             <a:pPr lvl="4"/>
             <a:r>
-              <a:rPr lang="en-US" smtClean="0"/>
+              <a:rPr lang="en-US"/>
               <a:t>Fifth level</a:t>
             </a:r>
             <a:endParaRPr lang="en-US" dirty="0"/>
@@ -2600,7 +2600,7 @@
           <a:p>
             <a:pPr lvl="0"/>
             <a:r>
-              <a:rPr lang="en-US" smtClean="0"/>
+              <a:rPr lang="en-US"/>
               <a:t>Click to edit Master text styles</a:t>
             </a:r>
           </a:p>
@@ -2632,7 +2632,7 @@
           <a:p>
             <a:fld id="{3A9514F2-6314-4A32-A45D-D19894738DE7}" type="datetimeFigureOut">
               <a:rPr lang="en-US" smtClean="0"/>
-              <a:t>3/7/2017</a:t>
+              <a:t>3/9/2017</a:t>
             </a:fld>
             <a:endParaRPr lang="en-US"/>
           </a:p>
@@ -2800,7 +2800,7 @@
           </a:lstStyle>
           <a:p>
             <a:r>
-              <a:rPr lang="en-US" smtClean="0"/>
+              <a:rPr lang="en-US"/>
               <a:t>Click to edit Master title style</a:t>
             </a:r>
             <a:endParaRPr lang="en-US" dirty="0"/>
@@ -2871,7 +2871,7 @@
           </a:lstStyle>
           <a:p>
             <a:r>
-              <a:rPr lang="en-US" smtClean="0"/>
+              <a:rPr lang="en-US"/>
               <a:t>Click icon to add picture</a:t>
             </a:r>
             <a:endParaRPr lang="en-US" dirty="0"/>
@@ -2949,7 +2949,7 @@
           <a:p>
             <a:pPr lvl="0"/>
             <a:r>
-              <a:rPr lang="en-US" smtClean="0"/>
+              <a:rPr lang="en-US"/>
               <a:t>Click to edit Master text styles</a:t>
             </a:r>
           </a:p>
@@ -2980,7 +2980,7 @@
           <a:p>
             <a:fld id="{3A9514F2-6314-4A32-A45D-D19894738DE7}" type="datetimeFigureOut">
               <a:rPr lang="en-US" smtClean="0"/>
-              <a:t>3/7/2017</a:t>
+              <a:t>3/9/2017</a:t>
             </a:fld>
             <a:endParaRPr lang="en-US"/>
           </a:p>
@@ -3183,7 +3183,7 @@
           <a:lstStyle/>
           <a:p>
             <a:r>
-              <a:rPr lang="en-US" smtClean="0"/>
+              <a:rPr lang="en-US"/>
               <a:t>Click to edit Master title style</a:t>
             </a:r>
             <a:endParaRPr lang="en-US" dirty="0"/>
@@ -3217,35 +3217,35 @@
           <a:p>
             <a:pPr lvl="0"/>
             <a:r>
-              <a:rPr lang="en-US" smtClean="0"/>
+              <a:rPr lang="en-US"/>
               <a:t>Click to edit Master text styles</a:t>
             </a:r>
           </a:p>
           <a:p>
             <a:pPr lvl="1"/>
             <a:r>
-              <a:rPr lang="en-US" smtClean="0"/>
+              <a:rPr lang="en-US"/>
               <a:t>Second level</a:t>
             </a:r>
           </a:p>
           <a:p>
             <a:pPr lvl="2"/>
             <a:r>
-              <a:rPr lang="en-US" smtClean="0"/>
+              <a:rPr lang="en-US"/>
               <a:t>Third level</a:t>
             </a:r>
           </a:p>
           <a:p>
             <a:pPr lvl="3"/>
             <a:r>
-              <a:rPr lang="en-US" smtClean="0"/>
+              <a:rPr lang="en-US"/>
               <a:t>Fourth level</a:t>
             </a:r>
           </a:p>
           <a:p>
             <a:pPr lvl="4"/>
             <a:r>
-              <a:rPr lang="en-US" smtClean="0"/>
+              <a:rPr lang="en-US"/>
               <a:t>Fifth level</a:t>
             </a:r>
             <a:endParaRPr lang="en-US" dirty="0"/>
@@ -3285,7 +3285,7 @@
           <a:p>
             <a:fld id="{3A9514F2-6314-4A32-A45D-D19894738DE7}" type="datetimeFigureOut">
               <a:rPr lang="en-US" smtClean="0"/>
-              <a:t>3/7/2017</a:t>
+              <a:t>3/9/2017</a:t>
             </a:fld>
             <a:endParaRPr lang="en-US"/>
           </a:p>
@@ -3826,13 +3826,8 @@
           <a:p>
             <a:r>
               <a:rPr lang="en-US" dirty="0"/>
-              <a:t>T</a:t>
-            </a:r>
-            <a:r>
-              <a:rPr lang="en-US" dirty="0" smtClean="0"/>
-              <a:t>he Angular CLI</a:t>
-            </a:r>
-            <a:endParaRPr lang="en-US" dirty="0"/>
+              <a:t>The Angular CLI</a:t>
+            </a:r>
           </a:p>
         </p:txBody>
       </p:sp>
@@ -3848,37 +3843,65 @@
         </p:nvSpPr>
         <p:spPr>
           <a:xfrm>
-            <a:off x="2150364" y="4493669"/>
-            <a:ext cx="7891272" cy="1069848"/>
+            <a:off x="3999432" y="4493669"/>
+            <a:ext cx="6042204" cy="1479292"/>
           </a:xfrm>
         </p:spPr>
         <p:txBody>
           <a:bodyPr>
-            <a:normAutofit fontScale="77500" lnSpcReduction="20000"/>
+            <a:normAutofit/>
           </a:bodyPr>
           <a:lstStyle/>
           <a:p>
             <a:r>
               <a:rPr lang="en-US" dirty="0"/>
-              <a:t>By Isaac </a:t>
-            </a:r>
-            <a:r>
-              <a:rPr lang="en-US" dirty="0" smtClean="0"/>
-              <a:t>Martinez</a:t>
-            </a:r>
-          </a:p>
-          <a:p>
-            <a:r>
-              <a:rPr lang="en-US" dirty="0" smtClean="0"/>
+              <a:t>Isaac Martinez</a:t>
+            </a:r>
+            <a:br>
+              <a:rPr lang="en-US" dirty="0"/>
+            </a:br>
+            <a:r>
+              <a:rPr lang="en-US" sz="1200" cap="none" dirty="0"/>
               <a:t>Software Architect</a:t>
             </a:r>
-          </a:p>
-          <a:p>
-            <a:r>
-              <a:rPr lang="en-US" dirty="0" err="1" smtClean="0"/>
+            <a:br>
+              <a:rPr lang="en-US" sz="1200" cap="none" dirty="0"/>
+            </a:br>
+            <a:r>
+              <a:rPr lang="en-US" sz="1200" cap="none" dirty="0" err="1"/>
               <a:t>TravelTab</a:t>
             </a:r>
-            <a:endParaRPr lang="en-US" dirty="0"/>
+            <a:endParaRPr lang="en-US" sz="1200" cap="none" dirty="0"/>
+          </a:p>
+          <a:p>
+            <a:r>
+              <a:rPr lang="en-US" sz="1200" cap="none" dirty="0"/>
+              <a:t>Twitter: @</a:t>
+            </a:r>
+            <a:r>
+              <a:rPr lang="en-US" sz="1200" cap="none" dirty="0" err="1"/>
+              <a:t>IkeMtz</a:t>
+            </a:r>
+            <a:br>
+              <a:rPr lang="en-US" sz="1200" cap="none" dirty="0"/>
+            </a:br>
+            <a:r>
+              <a:rPr lang="en-US" sz="1200" cap="none" dirty="0"/>
+              <a:t>Email: </a:t>
+            </a:r>
+            <a:r>
+              <a:rPr lang="en-US" sz="1200" cap="none" dirty="0" err="1"/>
+              <a:t>pcalchi@</a:t>
+            </a:r>
+            <a:r>
+              <a:rPr lang="en-US" sz="1200" cap="none" err="1"/>
+              <a:t>aim</a:t>
+            </a:r>
+            <a:r>
+              <a:rPr lang="en-US" sz="1200" cap="none"/>
+              <a:t>.com</a:t>
+            </a:r>
+            <a:endParaRPr lang="en-US" sz="1200" cap="none" dirty="0"/>
           </a:p>
         </p:txBody>
       </p:sp>
@@ -3961,13 +3984,6 @@
   <p:clrMapOvr>
     <a:masterClrMapping/>
   </p:clrMapOvr>
-  <p:timing>
-    <p:tnLst>
-      <p:par>
-        <p:cTn id="1" dur="indefinite" restart="never" nodeType="tmRoot"/>
-      </p:par>
-    </p:tnLst>
-  </p:timing>
 </p:sld>
 </file>
 
@@ -4012,38 +4028,18 @@
           <a:p>
             <a:pPr algn="ctr"/>
             <a:r>
-              <a:rPr lang="en-US" dirty="0" smtClean="0"/>
+              <a:rPr lang="en-US" dirty="0"/>
               <a:t>The Hero-Form</a:t>
             </a:r>
             <a:br>
-              <a:rPr lang="en-US" dirty="0" smtClean="0"/>
+              <a:rPr lang="en-US" dirty="0"/>
             </a:br>
-            <a:r>
-              <a:rPr lang="en-US" dirty="0" smtClean="0"/>
-              <a:t/>
-            </a:r>
             <a:br>
-              <a:rPr lang="en-US" dirty="0" smtClean="0"/>
+              <a:rPr lang="en-US" dirty="0"/>
             </a:br>
-            <a:r>
-              <a:rPr lang="en-US" sz="2000" dirty="0" smtClean="0"/>
-              <a:t/>
-            </a:r>
             <a:br>
-              <a:rPr lang="en-US" sz="2000" dirty="0" smtClean="0"/>
+              <a:rPr lang="en-US" sz="2000" dirty="0"/>
             </a:br>
-            <a:r>
-              <a:rPr lang="en-US" sz="3200" cap="none" dirty="0" smtClean="0">
-                <a:solidFill>
-                  <a:schemeClr val="bg1">
-                    <a:lumMod val="50000"/>
-                  </a:schemeClr>
-                </a:solidFill>
-                <a:latin typeface="Courier New" panose="02070309020205020404" pitchFamily="49" charset="0"/>
-                <a:cs typeface="Courier New" panose="02070309020205020404" pitchFamily="49" charset="0"/>
-              </a:rPr>
-              <a:t>ng </a:t>
-            </a:r>
             <a:r>
               <a:rPr lang="en-US" sz="3200" cap="none" dirty="0">
                 <a:solidFill>
@@ -4054,22 +4050,10 @@
                 <a:latin typeface="Courier New" panose="02070309020205020404" pitchFamily="49" charset="0"/>
                 <a:cs typeface="Courier New" panose="02070309020205020404" pitchFamily="49" charset="0"/>
               </a:rPr>
-              <a:t>g </a:t>
-            </a:r>
-            <a:r>
-              <a:rPr lang="en-US" sz="3200" cap="none" dirty="0" smtClean="0">
-                <a:solidFill>
-                  <a:schemeClr val="bg1">
-                    <a:lumMod val="50000"/>
-                  </a:schemeClr>
-                </a:solidFill>
-                <a:latin typeface="Courier New" panose="02070309020205020404" pitchFamily="49" charset="0"/>
-                <a:cs typeface="Courier New" panose="02070309020205020404" pitchFamily="49" charset="0"/>
-              </a:rPr>
-              <a:t>class hero</a:t>
+              <a:t>ng g class hero</a:t>
             </a:r>
             <a:br>
-              <a:rPr lang="en-US" sz="3200" cap="none" dirty="0" smtClean="0">
+              <a:rPr lang="en-US" sz="3200" cap="none" dirty="0">
                 <a:solidFill>
                   <a:schemeClr val="bg1">
                     <a:lumMod val="50000"/>
@@ -4080,18 +4064,6 @@
               </a:rPr>
             </a:br>
             <a:r>
-              <a:rPr lang="en-US" sz="3200" cap="none" dirty="0" smtClean="0">
-                <a:solidFill>
-                  <a:schemeClr val="bg1">
-                    <a:lumMod val="50000"/>
-                  </a:schemeClr>
-                </a:solidFill>
-                <a:latin typeface="Courier New" panose="02070309020205020404" pitchFamily="49" charset="0"/>
-                <a:cs typeface="Courier New" panose="02070309020205020404" pitchFamily="49" charset="0"/>
-              </a:rPr>
-              <a:t>ng </a:t>
-            </a:r>
-            <a:r>
               <a:rPr lang="en-US" sz="3200" cap="none" dirty="0">
                 <a:solidFill>
                   <a:schemeClr val="bg1">
@@ -4101,39 +4073,16 @@
                 <a:latin typeface="Courier New" panose="02070309020205020404" pitchFamily="49" charset="0"/>
                 <a:cs typeface="Courier New" panose="02070309020205020404" pitchFamily="49" charset="0"/>
               </a:rPr>
-              <a:t>g </a:t>
-            </a:r>
-            <a:r>
-              <a:rPr lang="en-US" sz="3200" cap="none" dirty="0" smtClean="0">
-                <a:solidFill>
-                  <a:schemeClr val="bg1">
-                    <a:lumMod val="50000"/>
-                  </a:schemeClr>
-                </a:solidFill>
-                <a:latin typeface="Courier New" panose="02070309020205020404" pitchFamily="49" charset="0"/>
-                <a:cs typeface="Courier New" panose="02070309020205020404" pitchFamily="49" charset="0"/>
-              </a:rPr>
-              <a:t>component hero-form</a:t>
-            </a:r>
-            <a:r>
-              <a:rPr lang="en-US" sz="3200" cap="none" dirty="0" smtClean="0">
-                <a:latin typeface="Courier New" panose="02070309020205020404" pitchFamily="49" charset="0"/>
-                <a:cs typeface="Courier New" panose="02070309020205020404" pitchFamily="49" charset="0"/>
-              </a:rPr>
-              <a:t/>
+              <a:t>ng g component hero-form</a:t>
             </a:r>
             <a:br>
-              <a:rPr lang="en-US" sz="3200" cap="none" dirty="0" smtClean="0">
+              <a:rPr lang="en-US" sz="3200" cap="none" dirty="0">
                 <a:latin typeface="Courier New" panose="02070309020205020404" pitchFamily="49" charset="0"/>
                 <a:cs typeface="Courier New" panose="02070309020205020404" pitchFamily="49" charset="0"/>
               </a:rPr>
             </a:br>
-            <a:r>
-              <a:rPr lang="en-US" dirty="0" smtClean="0"/>
-              <a:t/>
-            </a:r>
             <a:br>
-              <a:rPr lang="en-US" dirty="0" smtClean="0"/>
+              <a:rPr lang="en-US" dirty="0"/>
             </a:br>
             <a:r>
               <a:rPr lang="en-US" sz="3600" cap="none" dirty="0">
@@ -4155,13 +4104,6 @@
   <p:clrMapOvr>
     <a:masterClrMapping/>
   </p:clrMapOvr>
-  <p:timing>
-    <p:tnLst>
-      <p:par>
-        <p:cTn id="1" dur="indefinite" restart="never" nodeType="tmRoot"/>
-      </p:par>
-    </p:tnLst>
-  </p:timing>
 </p:sld>
 </file>
 
@@ -4207,62 +4149,37 @@
             <a:pPr algn="ctr"/>
             <a:r>
               <a:rPr lang="en-US" dirty="0"/>
-              <a:t>STEP 4: </a:t>
-            </a:r>
-            <a:r>
-              <a:rPr lang="en-US" dirty="0" smtClean="0"/>
-              <a:t>CLI </a:t>
-            </a:r>
-            <a:r>
-              <a:rPr lang="en-US" dirty="0" err="1" smtClean="0"/>
-              <a:t>Lintin</a:t>
-            </a:r>
-            <a:r>
-              <a:rPr lang="en-US" dirty="0" err="1" smtClean="0"/>
-              <a:t>g</a:t>
-            </a:r>
-            <a:r>
-              <a:rPr lang="en-US" dirty="0" smtClean="0"/>
-              <a:t/>
+              <a:t>STEP 4: CLI </a:t>
+            </a:r>
+            <a:r>
+              <a:rPr lang="en-US" dirty="0" err="1"/>
+              <a:t>Linting</a:t>
             </a:r>
             <a:br>
-              <a:rPr lang="en-US" dirty="0" smtClean="0"/>
+              <a:rPr lang="en-US" dirty="0"/>
             </a:br>
-            <a:r>
-              <a:rPr lang="en-US" dirty="0" smtClean="0"/>
-              <a:t/>
-            </a:r>
             <a:br>
-              <a:rPr lang="en-US" dirty="0" smtClean="0"/>
+              <a:rPr lang="en-US" dirty="0"/>
             </a:br>
             <a:r>
-              <a:rPr lang="en-US" sz="2200" cap="none" dirty="0" smtClean="0"/>
+              <a:rPr lang="en-US" sz="2200" cap="none" dirty="0"/>
               <a:t>Branch: Step4a </a:t>
             </a:r>
             <a:r>
-              <a:rPr lang="en-US" sz="2200" dirty="0" smtClean="0"/>
+              <a:rPr lang="en-US" sz="2200" dirty="0"/>
               <a:t>– Lint FAIL</a:t>
             </a:r>
             <a:br>
-              <a:rPr lang="en-US" sz="2200" dirty="0" smtClean="0"/>
+              <a:rPr lang="en-US" sz="2200" dirty="0"/>
             </a:br>
             <a:r>
               <a:rPr lang="en-US" sz="2200" cap="none" dirty="0"/>
-              <a:t>Branch: </a:t>
-            </a:r>
-            <a:r>
-              <a:rPr lang="en-US" sz="2200" cap="none" dirty="0" smtClean="0"/>
-              <a:t>Step4b </a:t>
+              <a:t>Branch: Step4b </a:t>
             </a:r>
             <a:r>
               <a:rPr lang="en-US" sz="2200" dirty="0"/>
-              <a:t>– </a:t>
-            </a:r>
-            <a:r>
-              <a:rPr lang="en-US" sz="2200" dirty="0" smtClean="0"/>
-              <a:t>Lint Pass</a:t>
-            </a:r>
-            <a:endParaRPr lang="en-US" sz="2200" dirty="0"/>
+              <a:t>– Lint Pass</a:t>
+            </a:r>
           </a:p>
         </p:txBody>
       </p:sp>
@@ -4299,22 +4216,10 @@
                 <a:latin typeface="Courier New" panose="02070309020205020404" pitchFamily="49" charset="0"/>
                 <a:cs typeface="Courier New" panose="02070309020205020404" pitchFamily="49" charset="0"/>
               </a:rPr>
-              <a:t>ng </a:t>
-            </a:r>
-            <a:r>
-              <a:rPr lang="en-US" sz="3200" dirty="0" smtClean="0">
-                <a:solidFill>
-                  <a:schemeClr val="bg1">
-                    <a:lumMod val="50000"/>
-                  </a:schemeClr>
-                </a:solidFill>
-                <a:latin typeface="Courier New" panose="02070309020205020404" pitchFamily="49" charset="0"/>
-                <a:cs typeface="Courier New" panose="02070309020205020404" pitchFamily="49" charset="0"/>
-              </a:rPr>
-              <a:t>lint</a:t>
+              <a:t>ng lint</a:t>
             </a:r>
             <a:br>
-              <a:rPr lang="en-US" sz="3200" dirty="0" smtClean="0">
+              <a:rPr lang="en-US" sz="3200" dirty="0">
                 <a:solidFill>
                   <a:schemeClr val="bg1">
                     <a:lumMod val="50000"/>
@@ -4324,7 +4229,7 @@
                 <a:cs typeface="Courier New" panose="02070309020205020404" pitchFamily="49" charset="0"/>
               </a:rPr>
             </a:br>
-            <a:endParaRPr lang="en-US" sz="3200" dirty="0" smtClean="0">
+            <a:endParaRPr lang="en-US" sz="3200" dirty="0">
               <a:solidFill>
                 <a:schemeClr val="bg1">
                   <a:lumMod val="50000"/>
@@ -4336,34 +4241,30 @@
           </a:p>
           <a:p>
             <a:r>
-              <a:rPr lang="en-US" dirty="0" smtClean="0"/>
+              <a:rPr lang="en-US" dirty="0"/>
               <a:t>NG Lint will run TS Lint on your code and report back code that doesn’t follow your rules.  Rules are specified in </a:t>
             </a:r>
             <a:r>
-              <a:rPr lang="en-US" dirty="0" err="1" smtClean="0"/>
+              <a:rPr lang="en-US" dirty="0" err="1"/>
               <a:t>tslint.json</a:t>
             </a:r>
             <a:r>
-              <a:rPr lang="en-US" dirty="0" smtClean="0"/>
+              <a:rPr lang="en-US" dirty="0"/>
               <a:t> and are customizable.</a:t>
             </a:r>
           </a:p>
           <a:p>
             <a:r>
-              <a:rPr lang="en-US" dirty="0" smtClean="0"/>
+              <a:rPr lang="en-US" dirty="0"/>
               <a:t>Strongly recommend </a:t>
             </a:r>
             <a:r>
-              <a:rPr lang="en-US" dirty="0" err="1" smtClean="0"/>
+              <a:rPr lang="en-US" dirty="0" err="1"/>
               <a:t>TSLint</a:t>
             </a:r>
             <a:r>
-              <a:rPr lang="en-US" dirty="0" smtClean="0"/>
-              <a:t> VS </a:t>
-            </a:r>
-            <a:r>
-              <a:rPr lang="en-US" dirty="0"/>
-              <a:t>Code extension.</a:t>
+              <a:rPr lang="en-US" dirty="0"/>
+              <a:t> VS Code extension.</a:t>
             </a:r>
             <a:br>
               <a:rPr lang="en-US" dirty="0"/>
@@ -4372,18 +4273,12 @@
               <a:rPr lang="en-US" dirty="0">
                 <a:hlinkClick r:id="rId2"/>
               </a:rPr>
-              <a:t>https://</a:t>
-            </a:r>
-            <a:r>
-              <a:rPr lang="en-US" dirty="0" smtClean="0">
-                <a:hlinkClick r:id="rId2"/>
-              </a:rPr>
-              <a:t>marketplace.visualstudio.com/items?itemName=eg2.tslint</a:t>
-            </a:r>
-            <a:endParaRPr lang="en-US" dirty="0" smtClean="0"/>
-          </a:p>
-          <a:p>
-            <a:endParaRPr lang="en-US" dirty="0" smtClean="0"/>
+              <a:t>https://marketplace.visualstudio.com/items?itemName=eg2.tslint</a:t>
+            </a:r>
+            <a:endParaRPr lang="en-US" dirty="0"/>
+          </a:p>
+          <a:p>
+            <a:endParaRPr lang="en-US" dirty="0"/>
           </a:p>
         </p:txBody>
       </p:sp>
@@ -4397,13 +4292,6 @@
   <p:clrMapOvr>
     <a:masterClrMapping/>
   </p:clrMapOvr>
-  <p:timing>
-    <p:tnLst>
-      <p:par>
-        <p:cTn id="1" dur="indefinite" restart="never" nodeType="tmRoot"/>
-      </p:par>
-    </p:tnLst>
-  </p:timing>
 </p:sld>
 </file>
 
@@ -4449,31 +4337,18 @@
             <a:pPr algn="ctr"/>
             <a:r>
               <a:rPr lang="en-US" dirty="0"/>
-              <a:t>STEP </a:t>
-            </a:r>
-            <a:r>
-              <a:rPr lang="en-US" dirty="0" smtClean="0"/>
-              <a:t>5: CLI Unit Testing</a:t>
+              <a:t>STEP 5: CLI Unit Testing</a:t>
             </a:r>
             <a:br>
-              <a:rPr lang="en-US" dirty="0" smtClean="0"/>
+              <a:rPr lang="en-US" dirty="0"/>
             </a:br>
-            <a:r>
-              <a:rPr lang="en-US" sz="2200" dirty="0" smtClean="0"/>
-              <a:t/>
-            </a:r>
             <a:br>
-              <a:rPr lang="en-US" sz="2200" dirty="0" smtClean="0"/>
+              <a:rPr lang="en-US" sz="2200" dirty="0"/>
             </a:br>
             <a:r>
               <a:rPr lang="en-US" sz="2200" cap="none" dirty="0"/>
-              <a:t>Branch: </a:t>
-            </a:r>
-            <a:r>
-              <a:rPr lang="en-US" sz="2200" cap="none" dirty="0" smtClean="0"/>
-              <a:t>Step5</a:t>
-            </a:r>
-            <a:endParaRPr lang="en-US" sz="2200" cap="none" dirty="0"/>
+              <a:t>Branch: Step5</a:t>
+            </a:r>
           </a:p>
         </p:txBody>
       </p:sp>
@@ -4512,34 +4387,10 @@
                 <a:latin typeface="Courier New" panose="02070309020205020404" pitchFamily="49" charset="0"/>
                 <a:cs typeface="Courier New" panose="02070309020205020404" pitchFamily="49" charset="0"/>
               </a:rPr>
-              <a:t>ng </a:t>
-            </a:r>
-            <a:r>
-              <a:rPr lang="en-US" sz="3200" dirty="0" smtClean="0">
-                <a:solidFill>
-                  <a:schemeClr val="bg1">
-                    <a:lumMod val="50000"/>
-                  </a:schemeClr>
-                </a:solidFill>
-                <a:latin typeface="Courier New" panose="02070309020205020404" pitchFamily="49" charset="0"/>
-                <a:cs typeface="Courier New" panose="02070309020205020404" pitchFamily="49" charset="0"/>
-              </a:rPr>
-              <a:t>test</a:t>
-            </a:r>
-            <a:r>
-              <a:rPr lang="en-US" dirty="0" smtClean="0">
-                <a:solidFill>
-                  <a:schemeClr val="bg1">
-                    <a:lumMod val="50000"/>
-                  </a:schemeClr>
-                </a:solidFill>
-                <a:latin typeface="Courier New" panose="02070309020205020404" pitchFamily="49" charset="0"/>
-                <a:cs typeface="Courier New" panose="02070309020205020404" pitchFamily="49" charset="0"/>
-              </a:rPr>
-              <a:t/>
+              <a:t>ng test</a:t>
             </a:r>
             <a:br>
-              <a:rPr lang="en-US" dirty="0" smtClean="0">
+              <a:rPr lang="en-US" dirty="0">
                 <a:solidFill>
                   <a:schemeClr val="bg1">
                     <a:lumMod val="50000"/>
@@ -4549,7 +4400,7 @@
                 <a:cs typeface="Courier New" panose="02070309020205020404" pitchFamily="49" charset="0"/>
               </a:rPr>
             </a:br>
-            <a:endParaRPr lang="en-US" dirty="0" smtClean="0">
+            <a:endParaRPr lang="en-US" dirty="0">
               <a:solidFill>
                 <a:schemeClr val="bg1">
                   <a:lumMod val="50000"/>
@@ -4561,31 +4412,31 @@
           </a:p>
           <a:p>
             <a:r>
-              <a:rPr lang="en-US" dirty="0" smtClean="0"/>
+              <a:rPr lang="en-US" dirty="0"/>
               <a:t>NG Test will execute a Karma test run on your code using your spec files.  These spec files are generated by the CLI scaffolding.</a:t>
             </a:r>
           </a:p>
           <a:p>
             <a:r>
-              <a:rPr lang="en-US" dirty="0" smtClean="0"/>
+              <a:rPr lang="en-US" dirty="0"/>
               <a:t>99.9% of the time you will have to edit these files in order for your test to pass.</a:t>
             </a:r>
           </a:p>
           <a:p>
             <a:r>
-              <a:rPr lang="en-US" dirty="0" smtClean="0"/>
+              <a:rPr lang="en-US" dirty="0"/>
               <a:t>Supports “--watch”, save your files and your test will automatically rerun.</a:t>
             </a:r>
           </a:p>
           <a:p>
             <a:r>
-              <a:rPr lang="en-US" dirty="0" smtClean="0"/>
+              <a:rPr lang="en-US" dirty="0"/>
               <a:t>Supports “--code-coverage”, will generate html report showing code coverage percentage and which lines are not covered.</a:t>
             </a:r>
           </a:p>
           <a:p>
             <a:r>
-              <a:rPr lang="en-US" dirty="0" smtClean="0"/>
+              <a:rPr lang="en-US" dirty="0"/>
               <a:t>Supports multiple browsers</a:t>
             </a:r>
           </a:p>
@@ -4601,13 +4452,6 @@
   <p:clrMapOvr>
     <a:masterClrMapping/>
   </p:clrMapOvr>
-  <p:timing>
-    <p:tnLst>
-      <p:par>
-        <p:cTn id="1" dur="indefinite" restart="never" nodeType="tmRoot"/>
-      </p:par>
-    </p:tnLst>
-  </p:timing>
 </p:sld>
 </file>
 
@@ -4653,31 +4497,18 @@
             <a:pPr algn="ctr"/>
             <a:r>
               <a:rPr lang="en-US" dirty="0"/>
-              <a:t>STEP </a:t>
-            </a:r>
-            <a:r>
-              <a:rPr lang="en-US" dirty="0" smtClean="0"/>
-              <a:t>6: CLI E2E Testing</a:t>
+              <a:t>STEP 6: CLI E2E Testing</a:t>
             </a:r>
             <a:br>
-              <a:rPr lang="en-US" dirty="0" smtClean="0"/>
+              <a:rPr lang="en-US" dirty="0"/>
             </a:br>
-            <a:r>
-              <a:rPr lang="en-US" sz="2200" dirty="0" smtClean="0"/>
-              <a:t/>
-            </a:r>
             <a:br>
-              <a:rPr lang="en-US" sz="2200" dirty="0" smtClean="0"/>
+              <a:rPr lang="en-US" sz="2200" dirty="0"/>
             </a:br>
             <a:r>
               <a:rPr lang="en-US" sz="2200" cap="none" dirty="0"/>
-              <a:t>Branch: </a:t>
-            </a:r>
-            <a:r>
-              <a:rPr lang="en-US" sz="2200" cap="none" dirty="0" smtClean="0"/>
-              <a:t>Step6</a:t>
-            </a:r>
-            <a:endParaRPr lang="en-US" sz="2200" cap="none" dirty="0"/>
+              <a:t>Branch: Step6</a:t>
+            </a:r>
           </a:p>
         </p:txBody>
       </p:sp>
@@ -4716,56 +4547,36 @@
                 <a:latin typeface="Courier New" panose="02070309020205020404" pitchFamily="49" charset="0"/>
                 <a:cs typeface="Courier New" panose="02070309020205020404" pitchFamily="49" charset="0"/>
               </a:rPr>
-              <a:t>ng </a:t>
-            </a:r>
-            <a:r>
-              <a:rPr lang="en-US" sz="3200" dirty="0" smtClean="0">
-                <a:solidFill>
-                  <a:schemeClr val="bg1">
-                    <a:lumMod val="50000"/>
-                  </a:schemeClr>
-                </a:solidFill>
-                <a:latin typeface="Courier New" panose="02070309020205020404" pitchFamily="49" charset="0"/>
-                <a:cs typeface="Courier New" panose="02070309020205020404" pitchFamily="49" charset="0"/>
-              </a:rPr>
-              <a:t>e2e</a:t>
-            </a:r>
-            <a:r>
-              <a:rPr lang="en-US" dirty="0" smtClean="0">
-                <a:latin typeface="Courier New" panose="02070309020205020404" pitchFamily="49" charset="0"/>
-                <a:cs typeface="Courier New" panose="02070309020205020404" pitchFamily="49" charset="0"/>
-              </a:rPr>
-              <a:t/>
+              <a:t>ng e2e</a:t>
             </a:r>
             <a:br>
-              <a:rPr lang="en-US" dirty="0" smtClean="0">
+              <a:rPr lang="en-US" dirty="0">
                 <a:latin typeface="Courier New" panose="02070309020205020404" pitchFamily="49" charset="0"/>
                 <a:cs typeface="Courier New" panose="02070309020205020404" pitchFamily="49" charset="0"/>
               </a:rPr>
             </a:br>
-            <a:endParaRPr lang="en-US" dirty="0" smtClean="0">
+            <a:endParaRPr lang="en-US" dirty="0">
               <a:latin typeface="Courier New" panose="02070309020205020404" pitchFamily="49" charset="0"/>
               <a:cs typeface="Courier New" panose="02070309020205020404" pitchFamily="49" charset="0"/>
             </a:endParaRPr>
           </a:p>
           <a:p>
             <a:r>
-              <a:rPr lang="en-US" dirty="0" smtClean="0"/>
+              <a:rPr lang="en-US" dirty="0"/>
               <a:t>Currently there is a bug in the app.e2e-spec.ts file.  Repository has fix.</a:t>
             </a:r>
           </a:p>
           <a:p>
             <a:r>
-              <a:rPr lang="en-US" dirty="0" smtClean="0"/>
+              <a:rPr lang="en-US" dirty="0"/>
               <a:t>Runs Protractor and allows you to create fully automated UI tests across multiple browsers.</a:t>
             </a:r>
           </a:p>
           <a:p>
             <a:r>
-              <a:rPr lang="en-US" dirty="0" smtClean="0"/>
+              <a:rPr lang="en-US" dirty="0"/>
               <a:t>Protractor documentation is seriously out of date and a few of the features don’t work on Angular 2 and above.</a:t>
             </a:r>
-            <a:endParaRPr lang="en-US" dirty="0" smtClean="0"/>
           </a:p>
         </p:txBody>
       </p:sp>
@@ -4779,13 +4590,6 @@
   <p:clrMapOvr>
     <a:masterClrMapping/>
   </p:clrMapOvr>
-  <p:timing>
-    <p:tnLst>
-      <p:par>
-        <p:cTn id="1" dur="indefinite" restart="never" nodeType="tmRoot"/>
-      </p:par>
-    </p:tnLst>
-  </p:timing>
 </p:sld>
 </file>
 
@@ -4825,7 +4629,7 @@
           <a:p>
             <a:pPr algn="ctr"/>
             <a:r>
-              <a:rPr lang="en-US" dirty="0" smtClean="0"/>
+              <a:rPr lang="en-US" dirty="0"/>
               <a:t>There are many more features!!!</a:t>
             </a:r>
             <a:endParaRPr lang="en-US" sz="2200" dirty="0"/>
@@ -4857,13 +4661,13 @@
             <a:pPr marL="0" indent="0">
               <a:buNone/>
             </a:pPr>
-            <a:endParaRPr lang="en-US" dirty="0" smtClean="0"/>
+            <a:endParaRPr lang="en-US" dirty="0"/>
           </a:p>
           <a:p>
             <a:pPr marL="0" indent="0">
               <a:buNone/>
             </a:pPr>
-            <a:endParaRPr lang="en-US" dirty="0" smtClean="0"/>
+            <a:endParaRPr lang="en-US" dirty="0"/>
           </a:p>
         </p:txBody>
       </p:sp>
@@ -5132,39 +4936,39 @@
           </a:lstStyle>
           <a:p>
             <a:r>
-              <a:rPr lang="en-US" dirty="0" smtClean="0"/>
+              <a:rPr lang="en-US" dirty="0"/>
               <a:t>Environment specific builds</a:t>
             </a:r>
           </a:p>
           <a:p>
             <a:r>
-              <a:rPr lang="en-US" dirty="0" smtClean="0"/>
+              <a:rPr lang="en-US" dirty="0"/>
               <a:t>AOT (Ahead of Time) compilation</a:t>
             </a:r>
           </a:p>
           <a:p>
             <a:r>
-              <a:rPr lang="en-US" dirty="0" smtClean="0"/>
+              <a:rPr lang="en-US" dirty="0"/>
               <a:t>Hot Module Reloading (requires some WebPack2 customization)</a:t>
             </a:r>
           </a:p>
           <a:p>
             <a:r>
-              <a:rPr lang="en-US" dirty="0" smtClean="0"/>
+              <a:rPr lang="en-US" dirty="0"/>
               <a:t>Support for Internalization</a:t>
             </a:r>
           </a:p>
           <a:p>
             <a:r>
-              <a:rPr lang="en-US" dirty="0" smtClean="0"/>
+              <a:rPr lang="en-US" dirty="0"/>
               <a:t>Less, Sass, </a:t>
             </a:r>
             <a:r>
-              <a:rPr lang="en-US" dirty="0" err="1" smtClean="0"/>
+              <a:rPr lang="en-US" dirty="0" err="1"/>
               <a:t>Scss</a:t>
             </a:r>
             <a:r>
-              <a:rPr lang="en-US" dirty="0" smtClean="0"/>
+              <a:rPr lang="en-US" dirty="0"/>
               <a:t> pre-processor compilation</a:t>
             </a:r>
           </a:p>
@@ -5210,13 +5014,6 @@
   <p:clrMapOvr>
     <a:masterClrMapping/>
   </p:clrMapOvr>
-  <p:timing>
-    <p:tnLst>
-      <p:par>
-        <p:cTn id="1" dur="indefinite" restart="never" nodeType="tmRoot"/>
-      </p:par>
-    </p:tnLst>
-  </p:timing>
 </p:sld>
 </file>
 
@@ -5286,10 +5083,6 @@
               </a:rPr>
               <a:t>https://angular.io/docs/ts/latest/</a:t>
             </a:r>
-            <a:r>
-              <a:rPr lang="en-US" dirty="0"/>
-              <a:t/>
-            </a:r>
             <a:br>
               <a:rPr lang="en-US" dirty="0"/>
             </a:br>
@@ -5306,10 +5099,6 @@
               </a:rPr>
               <a:t>https://github.com/angular/angular-cli</a:t>
             </a:r>
-            <a:r>
-              <a:rPr lang="en-US" dirty="0"/>
-              <a:t/>
-            </a:r>
             <a:br>
               <a:rPr lang="en-US" dirty="0"/>
             </a:br>
@@ -5326,10 +5115,6 @@
               </a:rPr>
               <a:t>https://angular.io/docs/ts/latest/tutorial/</a:t>
             </a:r>
-            <a:r>
-              <a:rPr lang="en-US" dirty="0"/>
-              <a:t/>
-            </a:r>
             <a:br>
               <a:rPr lang="en-US" dirty="0"/>
             </a:br>
@@ -5356,10 +5141,6 @@
               </a:rPr>
               <a:t>://www.typescriptlang.org/docs/tutorial.html</a:t>
             </a:r>
-            <a:r>
-              <a:rPr lang="en-US"/>
-              <a:t/>
-            </a:r>
             <a:br>
               <a:rPr lang="en-US"/>
             </a:br>
@@ -5385,10 +5166,6 @@
             <a:pPr marL="0" indent="0">
               <a:buNone/>
             </a:pPr>
-            <a:r>
-              <a:rPr lang="en-US" dirty="0"/>
-              <a:t/>
-            </a:r>
             <a:br>
               <a:rPr lang="en-US" dirty="0"/>
             </a:br>
@@ -5406,13 +5183,6 @@
   <p:clrMapOvr>
     <a:masterClrMapping/>
   </p:clrMapOvr>
-  <p:timing>
-    <p:tnLst>
-      <p:par>
-        <p:cTn id="1" dur="indefinite" restart="never" nodeType="tmRoot"/>
-      </p:par>
-    </p:tnLst>
-  </p:timing>
 </p:sld>
 </file>
 
@@ -5450,13 +5220,8 @@
           <a:p>
             <a:r>
               <a:rPr lang="en-US" dirty="0"/>
-              <a:t>Learning JavaScript in </a:t>
-            </a:r>
-            <a:r>
-              <a:rPr lang="en-US" dirty="0" smtClean="0"/>
-              <a:t>2017</a:t>
-            </a:r>
-            <a:endParaRPr lang="en-US" dirty="0"/>
+              <a:t>Learning JavaScript in 2017</a:t>
+            </a:r>
           </a:p>
         </p:txBody>
       </p:sp>
@@ -5512,13 +5277,6 @@
   <p:clrMapOvr>
     <a:masterClrMapping/>
   </p:clrMapOvr>
-  <p:timing>
-    <p:tnLst>
-      <p:par>
-        <p:cTn id="1" dur="indefinite" restart="never" nodeType="tmRoot"/>
-      </p:par>
-    </p:tnLst>
-  </p:timing>
 </p:sld>
 </file>
 
@@ -5680,13 +5438,6 @@
   <p:clrMapOvr>
     <a:masterClrMapping/>
   </p:clrMapOvr>
-  <p:timing>
-    <p:tnLst>
-      <p:par>
-        <p:cTn id="1" dur="indefinite" restart="never" nodeType="tmRoot"/>
-      </p:par>
-    </p:tnLst>
-  </p:timing>
 </p:sld>
 </file>
 
@@ -5724,15 +5475,7 @@
           <a:p>
             <a:r>
               <a:rPr lang="en-US" dirty="0"/>
-              <a:t>Installing the </a:t>
-            </a:r>
-            <a:r>
-              <a:rPr lang="en-US" dirty="0" smtClean="0"/>
-              <a:t>angular </a:t>
-            </a:r>
-            <a:r>
-              <a:rPr lang="en-US" dirty="0"/>
-              <a:t>cli</a:t>
+              <a:t>Installing the angular cli</a:t>
             </a:r>
           </a:p>
         </p:txBody>
@@ -5777,22 +5520,10 @@
                 <a:latin typeface="Courier New" panose="02070309020205020404" pitchFamily="49" charset="0"/>
                 <a:cs typeface="Courier New" panose="02070309020205020404" pitchFamily="49" charset="0"/>
               </a:rPr>
-              <a:t> install -g </a:t>
-            </a:r>
-            <a:r>
-              <a:rPr lang="en-US" sz="2400" dirty="0" smtClean="0">
-                <a:solidFill>
-                  <a:schemeClr val="bg1">
-                    <a:lumMod val="50000"/>
-                  </a:schemeClr>
-                </a:solidFill>
-                <a:latin typeface="Courier New" panose="02070309020205020404" pitchFamily="49" charset="0"/>
-                <a:cs typeface="Courier New" panose="02070309020205020404" pitchFamily="49" charset="0"/>
-              </a:rPr>
-              <a:t>@angular/</a:t>
-            </a:r>
-            <a:r>
-              <a:rPr lang="en-US" sz="2400" dirty="0" err="1" smtClean="0">
+              <a:t> install -g @angular/</a:t>
+            </a:r>
+            <a:r>
+              <a:rPr lang="en-US" sz="2400" dirty="0" err="1">
                 <a:solidFill>
                   <a:schemeClr val="bg1">
                     <a:lumMod val="50000"/>
@@ -5839,22 +5570,15 @@
               <a:rPr lang="en-US" dirty="0">
                 <a:hlinkClick r:id="rId2"/>
               </a:rPr>
-              <a:t>https://nodejs.org/en</a:t>
-            </a:r>
-            <a:r>
-              <a:rPr lang="en-US" dirty="0" smtClean="0">
-                <a:hlinkClick r:id="rId2"/>
-              </a:rPr>
-              <a:t>/</a:t>
-            </a:r>
-            <a:endParaRPr lang="en-US" dirty="0" smtClean="0"/>
-          </a:p>
-          <a:p>
-            <a:r>
-              <a:rPr lang="en-US" dirty="0" smtClean="0"/>
+              <a:t>https://nodejs.org/en/</a:t>
+            </a:r>
+            <a:endParaRPr lang="en-US" dirty="0"/>
+          </a:p>
+          <a:p>
+            <a:r>
+              <a:rPr lang="en-US" dirty="0"/>
               <a:t>Currently the CLI is at RC1 as of 3/3/17</a:t>
             </a:r>
-            <a:endParaRPr lang="en-US" dirty="0"/>
           </a:p>
           <a:p>
             <a:endParaRPr lang="en-US" dirty="0"/>
@@ -5901,13 +5625,6 @@
   <p:clrMapOvr>
     <a:masterClrMapping/>
   </p:clrMapOvr>
-  <p:timing>
-    <p:tnLst>
-      <p:par>
-        <p:cTn id="1" dur="indefinite" restart="never" nodeType="tmRoot"/>
-      </p:par>
-    </p:tnLst>
-  </p:timing>
 </p:sld>
 </file>
 
@@ -5949,10 +5666,9 @@
           <a:lstStyle/>
           <a:p>
             <a:r>
-              <a:rPr lang="en-US" dirty="0" smtClean="0"/>
+              <a:rPr lang="en-US" dirty="0"/>
               <a:t>Creating your first CLI project</a:t>
             </a:r>
-            <a:endParaRPr lang="en-US" dirty="0"/>
           </a:p>
         </p:txBody>
       </p:sp>
@@ -5982,7 +5698,7 @@
               <a:buNone/>
             </a:pPr>
             <a:r>
-              <a:rPr lang="en-US" dirty="0" smtClean="0"/>
+              <a:rPr lang="en-US" dirty="0"/>
               <a:t>Angular2:</a:t>
             </a:r>
           </a:p>
@@ -5991,7 +5707,7 @@
               <a:buNone/>
             </a:pPr>
             <a:r>
-              <a:rPr lang="en-US" sz="2400" dirty="0" smtClean="0">
+              <a:rPr lang="en-US" sz="2400" dirty="0">
                 <a:solidFill>
                   <a:schemeClr val="bg1">
                     <a:lumMod val="50000"/>
@@ -6000,34 +5716,10 @@
                 <a:latin typeface="Courier New" panose="02070309020205020404" pitchFamily="49" charset="0"/>
                 <a:cs typeface="Courier New" panose="02070309020205020404" pitchFamily="49" charset="0"/>
               </a:rPr>
-              <a:t>ng </a:t>
-            </a:r>
-            <a:r>
-              <a:rPr lang="en-US" sz="2400" dirty="0" smtClean="0">
-                <a:solidFill>
-                  <a:schemeClr val="bg1">
-                    <a:lumMod val="50000"/>
-                  </a:schemeClr>
-                </a:solidFill>
-                <a:latin typeface="Courier New" panose="02070309020205020404" pitchFamily="49" charset="0"/>
-                <a:cs typeface="Courier New" panose="02070309020205020404" pitchFamily="49" charset="0"/>
-              </a:rPr>
-              <a:t>new {app name} </a:t>
-            </a:r>
-            <a:r>
-              <a:rPr lang="en-US" sz="2400" dirty="0" smtClean="0">
-                <a:solidFill>
-                  <a:schemeClr val="bg1">
-                    <a:lumMod val="50000"/>
-                  </a:schemeClr>
-                </a:solidFill>
-                <a:latin typeface="Courier New" panose="02070309020205020404" pitchFamily="49" charset="0"/>
-                <a:cs typeface="Courier New" panose="02070309020205020404" pitchFamily="49" charset="0"/>
-              </a:rPr>
-              <a:t>--style </a:t>
-            </a:r>
-            <a:r>
-              <a:rPr lang="en-US" sz="2400" dirty="0" err="1" smtClean="0">
+              <a:t>ng new {app name} --style </a:t>
+            </a:r>
+            <a:r>
+              <a:rPr lang="en-US" sz="2400" dirty="0" err="1">
                 <a:solidFill>
                   <a:schemeClr val="bg1">
                     <a:lumMod val="50000"/>
@@ -6038,7 +5730,7 @@
               </a:rPr>
               <a:t>scss</a:t>
             </a:r>
-            <a:endParaRPr lang="en-US" sz="2400" dirty="0" smtClean="0">
+            <a:endParaRPr lang="en-US" sz="2400" dirty="0">
               <a:solidFill>
                 <a:schemeClr val="bg1">
                   <a:lumMod val="50000"/>
@@ -6053,7 +5745,7 @@
               <a:buNone/>
             </a:pPr>
             <a:r>
-              <a:rPr lang="en-US" dirty="0" smtClean="0"/>
+              <a:rPr lang="en-US" dirty="0"/>
               <a:t>Angular4:</a:t>
             </a:r>
           </a:p>
@@ -6061,18 +5753,6 @@
             <a:pPr marL="0" indent="0">
               <a:buNone/>
             </a:pPr>
-            <a:r>
-              <a:rPr lang="en-US" sz="2400" dirty="0" smtClean="0">
-                <a:solidFill>
-                  <a:schemeClr val="bg1">
-                    <a:lumMod val="50000"/>
-                  </a:schemeClr>
-                </a:solidFill>
-                <a:latin typeface="Courier New" panose="02070309020205020404" pitchFamily="49" charset="0"/>
-                <a:cs typeface="Courier New" panose="02070309020205020404" pitchFamily="49" charset="0"/>
-              </a:rPr>
-              <a:t>ng </a:t>
-            </a:r>
             <a:r>
               <a:rPr lang="en-US" sz="2400" dirty="0">
                 <a:solidFill>
@@ -6083,22 +5763,10 @@
                 <a:latin typeface="Courier New" panose="02070309020205020404" pitchFamily="49" charset="0"/>
                 <a:cs typeface="Courier New" panose="02070309020205020404" pitchFamily="49" charset="0"/>
               </a:rPr>
-              <a:t>new {app name} </a:t>
-            </a:r>
-            <a:r>
-              <a:rPr lang="en-US" sz="2400" dirty="0" smtClean="0">
-                <a:solidFill>
-                  <a:schemeClr val="bg1">
-                    <a:lumMod val="50000"/>
-                  </a:schemeClr>
-                </a:solidFill>
-                <a:latin typeface="Courier New" panose="02070309020205020404" pitchFamily="49" charset="0"/>
-                <a:cs typeface="Courier New" panose="02070309020205020404" pitchFamily="49" charset="0"/>
-              </a:rPr>
-              <a:t>--style </a:t>
-            </a:r>
-            <a:r>
-              <a:rPr lang="en-US" sz="2400" dirty="0" err="1" smtClean="0">
+              <a:t>ng new {app name} --style </a:t>
+            </a:r>
+            <a:r>
+              <a:rPr lang="en-US" sz="2400" dirty="0" err="1">
                 <a:solidFill>
                   <a:schemeClr val="bg1">
                     <a:lumMod val="50000"/>
@@ -6110,7 +5778,7 @@
               <a:t>scss</a:t>
             </a:r>
             <a:r>
-              <a:rPr lang="en-US" sz="2400" dirty="0" smtClean="0">
+              <a:rPr lang="en-US" sz="2400" dirty="0">
                 <a:solidFill>
                   <a:schemeClr val="bg1">
                     <a:lumMod val="50000"/>
@@ -6119,19 +5787,7 @@
                 <a:latin typeface="Courier New" panose="02070309020205020404" pitchFamily="49" charset="0"/>
                 <a:cs typeface="Courier New" panose="02070309020205020404" pitchFamily="49" charset="0"/>
               </a:rPr>
-              <a:t> --ng4 </a:t>
-            </a:r>
-            <a:r>
-              <a:rPr lang="en-US" sz="2400" dirty="0" smtClean="0">
-                <a:solidFill>
-                  <a:schemeClr val="bg1">
-                    <a:lumMod val="50000"/>
-                  </a:schemeClr>
-                </a:solidFill>
-                <a:latin typeface="Courier New" panose="02070309020205020404" pitchFamily="49" charset="0"/>
-                <a:cs typeface="Courier New" panose="02070309020205020404" pitchFamily="49" charset="0"/>
-              </a:rPr>
-              <a:t>true</a:t>
+              <a:t> --ng4 true</a:t>
             </a:r>
           </a:p>
           <a:p>
@@ -6146,61 +5802,33 @@
           <a:p>
             <a:r>
               <a:rPr lang="en-US" dirty="0"/>
-              <a:t>Scaffolds Angular </a:t>
-            </a:r>
-            <a:r>
-              <a:rPr lang="en-US" dirty="0" smtClean="0"/>
-              <a:t>2/4 </a:t>
-            </a:r>
-            <a:r>
-              <a:rPr lang="en-US" dirty="0" smtClean="0"/>
-              <a:t>project</a:t>
-            </a:r>
-          </a:p>
-          <a:p>
-            <a:r>
-              <a:rPr lang="en-US" dirty="0" smtClean="0"/>
-              <a:t>Sets </a:t>
-            </a:r>
-            <a:r>
-              <a:rPr lang="en-US" dirty="0"/>
-              <a:t>up project to use </a:t>
-            </a:r>
-            <a:r>
-              <a:rPr lang="en-US" dirty="0" err="1" smtClean="0"/>
+              <a:t>Scaffolds Angular 2/4 project</a:t>
+            </a:r>
+          </a:p>
+          <a:p>
+            <a:r>
+              <a:rPr lang="en-US" dirty="0"/>
+              <a:t>Sets up project to use </a:t>
+            </a:r>
+            <a:r>
+              <a:rPr lang="en-US" dirty="0" err="1"/>
               <a:t>Scss</a:t>
             </a:r>
             <a:r>
-              <a:rPr lang="en-US" dirty="0" smtClean="0"/>
-              <a:t> (Less/Sass </a:t>
-            </a:r>
-            <a:r>
-              <a:rPr lang="en-US" dirty="0"/>
-              <a:t>and plain CSS are also options</a:t>
-            </a:r>
-            <a:r>
-              <a:rPr lang="en-US" dirty="0" smtClean="0"/>
-              <a:t>)</a:t>
-            </a:r>
-          </a:p>
-          <a:p>
-            <a:r>
-              <a:rPr lang="en-US" dirty="0" smtClean="0"/>
-              <a:t>Sets </a:t>
-            </a:r>
-            <a:r>
-              <a:rPr lang="en-US" dirty="0"/>
-              <a:t>up project for unit and e2e (End To End) testing</a:t>
-            </a:r>
-          </a:p>
-          <a:p>
-            <a:r>
-              <a:rPr lang="en-US" dirty="0"/>
-              <a:t>Sets up a development </a:t>
-            </a:r>
-            <a:r>
-              <a:rPr lang="en-US" dirty="0" smtClean="0"/>
-              <a:t>server using </a:t>
+              <a:rPr lang="en-US" dirty="0"/>
+              <a:t> (Less/Sass and plain CSS are also options)</a:t>
+            </a:r>
+          </a:p>
+          <a:p>
+            <a:r>
+              <a:rPr lang="en-US" dirty="0"/>
+              <a:t>Sets up project for unit and e2e (End To End) testing</a:t>
+            </a:r>
+          </a:p>
+          <a:p>
+            <a:r>
+              <a:rPr lang="en-US" dirty="0"/>
+              <a:t>Sets up a development server using </a:t>
             </a:r>
             <a:r>
               <a:rPr lang="en-US" dirty="0" err="1"/>
@@ -6267,13 +5895,6 @@
   <p:clrMapOvr>
     <a:masterClrMapping/>
   </p:clrMapOvr>
-  <p:timing>
-    <p:tnLst>
-      <p:par>
-        <p:cTn id="1" dur="indefinite" restart="never" nodeType="tmRoot"/>
-      </p:par>
-    </p:tnLst>
-  </p:timing>
 </p:sld>
 </file>
 
@@ -6310,10 +5931,9 @@
           <a:lstStyle/>
           <a:p>
             <a:r>
-              <a:rPr lang="en-US" dirty="0" smtClean="0"/>
+              <a:rPr lang="en-US" dirty="0"/>
               <a:t>Things to consider</a:t>
             </a:r>
-            <a:endParaRPr lang="en-US" dirty="0"/>
           </a:p>
         </p:txBody>
       </p:sp>
@@ -6333,32 +5953,24 @@
           <a:lstStyle/>
           <a:p>
             <a:r>
-              <a:rPr lang="en-US" dirty="0" smtClean="0"/>
+              <a:rPr lang="en-US" dirty="0"/>
               <a:t>Angular CLI sets up your </a:t>
             </a:r>
             <a:r>
-              <a:rPr lang="en-US" dirty="0" err="1" smtClean="0"/>
+              <a:rPr lang="en-US" dirty="0" err="1"/>
               <a:t>package.json</a:t>
             </a:r>
             <a:r>
-              <a:rPr lang="en-US" dirty="0" smtClean="0"/>
+              <a:rPr lang="en-US" dirty="0"/>
               <a:t> file to use </a:t>
             </a:r>
             <a:r>
-              <a:rPr lang="en-US" dirty="0" err="1" smtClean="0"/>
+              <a:rPr lang="en-US" dirty="0" err="1"/>
               <a:t>semver</a:t>
             </a:r>
             <a:r>
-              <a:rPr lang="en-US" dirty="0" smtClean="0"/>
-              <a:t> (semantic versioning); this has the potential of breaking your project if </a:t>
-            </a:r>
-            <a:r>
-              <a:rPr lang="en-US" dirty="0" smtClean="0"/>
-              <a:t>an underlying dependency </a:t>
-            </a:r>
-            <a:r>
-              <a:rPr lang="en-US" dirty="0" smtClean="0"/>
-              <a:t>breaks.  Consider shrink wrapping.  </a:t>
+              <a:rPr lang="en-US" dirty="0"/>
+              <a:t> (semantic versioning); this has the potential of breaking your project if an underlying dependency breaks.  Consider shrink wrapping.  </a:t>
             </a:r>
           </a:p>
           <a:p>
@@ -6366,21 +5978,21 @@
               <a:buNone/>
             </a:pPr>
             <a:r>
-              <a:rPr lang="en-US" dirty="0" err="1" smtClean="0">
+              <a:rPr lang="en-US" dirty="0" err="1">
                 <a:latin typeface="Courier New" panose="02070309020205020404" pitchFamily="49" charset="0"/>
                 <a:cs typeface="Courier New" panose="02070309020205020404" pitchFamily="49" charset="0"/>
               </a:rPr>
               <a:t>npm</a:t>
             </a:r>
             <a:r>
-              <a:rPr lang="en-US" dirty="0" smtClean="0">
+              <a:rPr lang="en-US" dirty="0">
                 <a:latin typeface="Courier New" panose="02070309020205020404" pitchFamily="49" charset="0"/>
                 <a:cs typeface="Courier New" panose="02070309020205020404" pitchFamily="49" charset="0"/>
               </a:rPr>
               <a:t> </a:t>
             </a:r>
             <a:r>
-              <a:rPr lang="en-US" dirty="0" err="1" smtClean="0">
+              <a:rPr lang="en-US" dirty="0" err="1">
                 <a:latin typeface="Courier New" panose="02070309020205020404" pitchFamily="49" charset="0"/>
                 <a:cs typeface="Courier New" panose="02070309020205020404" pitchFamily="49" charset="0"/>
               </a:rPr>
@@ -6393,33 +6005,33 @@
           </a:p>
           <a:p>
             <a:r>
-              <a:rPr lang="en-US" dirty="0" smtClean="0"/>
+              <a:rPr lang="en-US" dirty="0"/>
               <a:t>There are other versions of the CLI available (with some differences)</a:t>
             </a:r>
           </a:p>
           <a:p>
             <a:pPr lvl="1"/>
             <a:r>
-              <a:rPr lang="en-US" dirty="0" err="1" smtClean="0"/>
+              <a:rPr lang="en-US" dirty="0" err="1"/>
               <a:t>NativeScript</a:t>
             </a:r>
             <a:r>
-              <a:rPr lang="en-US" dirty="0" smtClean="0"/>
+              <a:rPr lang="en-US" dirty="0"/>
               <a:t> CLI – Tooling for building </a:t>
             </a:r>
             <a:r>
-              <a:rPr lang="en-US" dirty="0" err="1" smtClean="0"/>
+              <a:rPr lang="en-US" dirty="0" err="1"/>
               <a:t>NativeScript</a:t>
             </a:r>
             <a:r>
-              <a:rPr lang="en-US" dirty="0" smtClean="0"/>
+              <a:rPr lang="en-US" dirty="0"/>
               <a:t> Angular applications that run on mobile platforms.</a:t>
             </a:r>
           </a:p>
           <a:p>
             <a:pPr lvl="1"/>
             <a:r>
-              <a:rPr lang="en-US" dirty="0" smtClean="0"/>
+              <a:rPr lang="en-US" dirty="0"/>
               <a:t>Universal CLI – Tooling for building Universal Angular applications. </a:t>
             </a:r>
           </a:p>
@@ -6435,13 +6047,6 @@
   <p:clrMapOvr>
     <a:masterClrMapping/>
   </p:clrMapOvr>
-  <p:timing>
-    <p:tnLst>
-      <p:par>
-        <p:cTn id="1" dur="indefinite" restart="never" nodeType="tmRoot"/>
-      </p:par>
-    </p:tnLst>
-  </p:timing>
 </p:sld>
 </file>
 
@@ -6486,21 +6091,17 @@
           <a:p>
             <a:pPr algn="ctr"/>
             <a:r>
-              <a:rPr lang="en-US" dirty="0" smtClean="0"/>
+              <a:rPr lang="en-US" dirty="0"/>
               <a:t>Starting Up the test environment</a:t>
             </a:r>
             <a:br>
-              <a:rPr lang="en-US" dirty="0" smtClean="0"/>
+              <a:rPr lang="en-US" dirty="0"/>
             </a:br>
-            <a:r>
-              <a:rPr lang="en-US" dirty="0" smtClean="0"/>
-              <a:t/>
-            </a:r>
             <a:br>
-              <a:rPr lang="en-US" dirty="0" smtClean="0"/>
+              <a:rPr lang="en-US" dirty="0"/>
             </a:br>
             <a:r>
-              <a:rPr lang="en-US" cap="none" dirty="0" smtClean="0">
+              <a:rPr lang="en-US" cap="none" dirty="0">
                 <a:solidFill>
                   <a:schemeClr val="bg1">
                     <a:lumMod val="50000"/>
@@ -6511,21 +6112,14 @@
               </a:rPr>
               <a:t>ng serve</a:t>
             </a:r>
-            <a:r>
-              <a:rPr lang="en-US" cap="none" dirty="0" smtClean="0">
-                <a:latin typeface="Courier New" panose="02070309020205020404" pitchFamily="49" charset="0"/>
-                <a:cs typeface="Courier New" panose="02070309020205020404" pitchFamily="49" charset="0"/>
-              </a:rPr>
-              <a:t/>
-            </a:r>
             <a:br>
-              <a:rPr lang="en-US" cap="none" dirty="0" smtClean="0">
+              <a:rPr lang="en-US" cap="none" dirty="0">
                 <a:latin typeface="Courier New" panose="02070309020205020404" pitchFamily="49" charset="0"/>
                 <a:cs typeface="Courier New" panose="02070309020205020404" pitchFamily="49" charset="0"/>
               </a:rPr>
             </a:br>
             <a:r>
-              <a:rPr lang="en-US" sz="4000" cap="none" dirty="0" smtClean="0">
+              <a:rPr lang="en-US" sz="4000" cap="none" dirty="0">
                 <a:cs typeface="Courier New" panose="02070309020205020404" pitchFamily="49" charset="0"/>
               </a:rPr>
               <a:t>Branch: Step1</a:t>
@@ -6574,13 +6168,6 @@
   <p:clrMapOvr>
     <a:masterClrMapping/>
   </p:clrMapOvr>
-  <p:timing>
-    <p:tnLst>
-      <p:par>
-        <p:cTn id="1" dur="indefinite" restart="never" nodeType="tmRoot"/>
-      </p:par>
-    </p:tnLst>
-  </p:timing>
 </p:sld>
 </file>
 
@@ -6618,18 +6205,17 @@
           <a:p>
             <a:pPr algn="ctr"/>
             <a:r>
-              <a:rPr lang="en-US" dirty="0" smtClean="0"/>
+              <a:rPr lang="en-US" dirty="0"/>
               <a:t>Adding 3</a:t>
             </a:r>
             <a:r>
-              <a:rPr lang="en-US" baseline="30000" dirty="0" smtClean="0"/>
+              <a:rPr lang="en-US" baseline="30000" dirty="0"/>
               <a:t>rd</a:t>
             </a:r>
             <a:r>
-              <a:rPr lang="en-US" dirty="0" smtClean="0"/>
+              <a:rPr lang="en-US" dirty="0"/>
               <a:t> Party Libraries</a:t>
             </a:r>
-            <a:endParaRPr lang="en-US" dirty="0"/>
           </a:p>
         </p:txBody>
       </p:sp>
@@ -6654,7 +6240,7 @@
               <a:buNone/>
             </a:pPr>
             <a:r>
-              <a:rPr lang="en-US" sz="4000" dirty="0" smtClean="0">
+              <a:rPr lang="en-US" sz="4000" dirty="0">
                 <a:latin typeface="+mj-lt"/>
                 <a:cs typeface="Courier New" panose="02070309020205020404" pitchFamily="49" charset="0"/>
               </a:rPr>
@@ -6663,28 +6249,28 @@
           </a:p>
           <a:p>
             <a:r>
-              <a:rPr lang="en-US" dirty="0" smtClean="0"/>
+              <a:rPr lang="en-US" dirty="0"/>
               <a:t>Edit the Angular-</a:t>
             </a:r>
             <a:r>
-              <a:rPr lang="en-US" dirty="0" err="1" smtClean="0"/>
+              <a:rPr lang="en-US" dirty="0" err="1"/>
               <a:t>cli.json</a:t>
             </a:r>
             <a:r>
-              <a:rPr lang="en-US" dirty="0" smtClean="0"/>
+              <a:rPr lang="en-US" dirty="0"/>
               <a:t> file and add the relevant assets to the respective styles and scripts arrays.</a:t>
             </a:r>
           </a:p>
           <a:p>
             <a:r>
-              <a:rPr lang="en-US" dirty="0" smtClean="0"/>
+              <a:rPr lang="en-US" dirty="0"/>
               <a:t>We’ll be adding Bootstrap 4 currently in alpha 6 to our project.</a:t>
             </a:r>
             <a:br>
-              <a:rPr lang="en-US" dirty="0" smtClean="0"/>
+              <a:rPr lang="en-US" dirty="0"/>
             </a:br>
             <a:r>
-              <a:rPr lang="en-US" sz="3200" dirty="0" err="1" smtClean="0">
+              <a:rPr lang="en-US" sz="3200" dirty="0" err="1">
                 <a:solidFill>
                   <a:schemeClr val="bg1">
                     <a:lumMod val="50000"/>
@@ -6696,7 +6282,7 @@
               <a:t>npm</a:t>
             </a:r>
             <a:r>
-              <a:rPr lang="en-US" sz="3200" dirty="0" smtClean="0">
+              <a:rPr lang="en-US" sz="3200" dirty="0">
                 <a:solidFill>
                   <a:schemeClr val="bg1">
                     <a:lumMod val="50000"/>
@@ -6712,12 +6298,8 @@
             <a:pPr marL="0" indent="0">
               <a:buNone/>
             </a:pPr>
-            <a:r>
-              <a:rPr lang="en-US" dirty="0" smtClean="0"/>
-              <a:t/>
-            </a:r>
             <a:br>
-              <a:rPr lang="en-US" dirty="0" smtClean="0"/>
+              <a:rPr lang="en-US" dirty="0"/>
             </a:br>
             <a:endParaRPr lang="en-US" dirty="0"/>
           </a:p>
@@ -6733,13 +6315,6 @@
   <p:clrMapOvr>
     <a:masterClrMapping/>
   </p:clrMapOvr>
-  <p:timing>
-    <p:tnLst>
-      <p:par>
-        <p:cTn id="1" dur="indefinite" restart="never" nodeType="tmRoot"/>
-      </p:par>
-    </p:tnLst>
-  </p:timing>
 </p:sld>
 </file>
 
@@ -6777,10 +6352,9 @@
           <a:p>
             <a:pPr algn="ctr"/>
             <a:r>
-              <a:rPr lang="en-US" dirty="0" smtClean="0"/>
+              <a:rPr lang="en-US" dirty="0"/>
               <a:t>SCAFFOLDING</a:t>
             </a:r>
-            <a:endParaRPr lang="en-US" dirty="0"/>
           </a:p>
         </p:txBody>
       </p:sp>
@@ -6805,7 +6379,7 @@
               <a:buNone/>
             </a:pPr>
             <a:r>
-              <a:rPr lang="en-US" sz="4000" dirty="0" smtClean="0">
+              <a:rPr lang="en-US" sz="4000" dirty="0">
                 <a:solidFill>
                   <a:schemeClr val="bg1">
                     <a:lumMod val="50000"/>
@@ -6819,46 +6393,45 @@
           </a:p>
           <a:p>
             <a:r>
-              <a:rPr lang="en-US" dirty="0" smtClean="0"/>
+              <a:rPr lang="en-US" dirty="0"/>
               <a:t>Module</a:t>
             </a:r>
           </a:p>
           <a:p>
             <a:r>
-              <a:rPr lang="en-US" dirty="0" smtClean="0"/>
+              <a:rPr lang="en-US" dirty="0"/>
               <a:t>Component</a:t>
             </a:r>
           </a:p>
           <a:p>
             <a:r>
-              <a:rPr lang="en-US" dirty="0" smtClean="0"/>
+              <a:rPr lang="en-US" dirty="0"/>
               <a:t>Route</a:t>
             </a:r>
           </a:p>
           <a:p>
             <a:r>
-              <a:rPr lang="en-US" dirty="0" smtClean="0"/>
+              <a:rPr lang="en-US" dirty="0"/>
               <a:t>Service</a:t>
             </a:r>
           </a:p>
           <a:p>
             <a:r>
-              <a:rPr lang="en-US" dirty="0" smtClean="0"/>
+              <a:rPr lang="en-US" dirty="0"/>
               <a:t>Directive</a:t>
             </a:r>
           </a:p>
           <a:p>
             <a:r>
-              <a:rPr lang="en-US" dirty="0" smtClean="0"/>
+              <a:rPr lang="en-US" dirty="0"/>
               <a:t>Pipe</a:t>
             </a:r>
           </a:p>
           <a:p>
             <a:r>
-              <a:rPr lang="en-US" dirty="0" smtClean="0"/>
+              <a:rPr lang="en-US" dirty="0"/>
               <a:t>Note: In most cases the CLI will generate unit tests for the generated code.</a:t>
             </a:r>
-            <a:endParaRPr lang="en-US" dirty="0"/>
           </a:p>
         </p:txBody>
       </p:sp>
@@ -6902,13 +6475,6 @@
   <p:clrMapOvr>
     <a:masterClrMapping/>
   </p:clrMapOvr>
-  <p:timing>
-    <p:tnLst>
-      <p:par>
-        <p:cTn id="1" dur="indefinite" restart="never" nodeType="tmRoot"/>
-      </p:par>
-    </p:tnLst>
-  </p:timing>
 </p:sld>
 </file>
 

</xml_diff>